<commit_message>
added a half animation in presentation
</commit_message>
<xml_diff>
--- a/диплом.pptx
+++ b/диплом.pptx
@@ -29,7 +29,7 @@
     <p:sldId id="263" r:id="rId17"/>
   </p:sldIdLst>
   <p:sldSz cx="9144000" cy="5143500" type="screen16x9"/>
-  <p:notesSz cx="6670675" cy="9777413"/>
+  <p:notesSz cx="6858000" cy="9144000"/>
   <p:defaultTextStyle>
     <a:defPPr>
       <a:defRPr lang="en-US"/>
@@ -211,8 +211,8 @@
         </p:nvSpPr>
         <p:spPr>
           <a:xfrm>
-            <a:off x="0" y="0"/>
-            <a:ext cx="2890626" cy="488871"/>
+            <a:off x="0" y="1"/>
+            <a:ext cx="2971800" cy="457200"/>
           </a:xfrm>
           <a:prstGeom prst="rect">
             <a:avLst/>
@@ -253,8 +253,8 @@
         </p:nvSpPr>
         <p:spPr>
           <a:xfrm>
-            <a:off x="3778505" y="0"/>
-            <a:ext cx="2890626" cy="488871"/>
+            <a:off x="3884613" y="1"/>
+            <a:ext cx="2971800" cy="457200"/>
           </a:xfrm>
           <a:prstGeom prst="rect">
             <a:avLst/>
@@ -302,8 +302,8 @@
         </p:nvSpPr>
         <p:spPr>
           <a:xfrm>
-            <a:off x="0" y="9286845"/>
-            <a:ext cx="2890626" cy="488871"/>
+            <a:off x="0" y="8685213"/>
+            <a:ext cx="2971800" cy="457200"/>
           </a:xfrm>
           <a:prstGeom prst="rect">
             <a:avLst/>
@@ -344,8 +344,8 @@
         </p:nvSpPr>
         <p:spPr>
           <a:xfrm>
-            <a:off x="3778505" y="9286845"/>
-            <a:ext cx="2890626" cy="488871"/>
+            <a:off x="3884613" y="8685213"/>
+            <a:ext cx="2971800" cy="457200"/>
           </a:xfrm>
           <a:prstGeom prst="rect">
             <a:avLst/>
@@ -430,8 +430,8 @@
         </p:nvSpPr>
         <p:spPr>
           <a:xfrm>
-            <a:off x="0" y="0"/>
-            <a:ext cx="2890626" cy="488871"/>
+            <a:off x="0" y="1"/>
+            <a:ext cx="2971800" cy="457200"/>
           </a:xfrm>
           <a:prstGeom prst="rect">
             <a:avLst/>
@@ -472,8 +472,8 @@
         </p:nvSpPr>
         <p:spPr>
           <a:xfrm>
-            <a:off x="3778505" y="0"/>
-            <a:ext cx="2890626" cy="488871"/>
+            <a:off x="3884613" y="1"/>
+            <a:ext cx="2971800" cy="457200"/>
           </a:xfrm>
           <a:prstGeom prst="rect">
             <a:avLst/>
@@ -521,8 +521,8 @@
         </p:nvSpPr>
         <p:spPr>
           <a:xfrm>
-            <a:off x="76200" y="733425"/>
-            <a:ext cx="6518275" cy="3667125"/>
+            <a:off x="381000" y="685800"/>
+            <a:ext cx="6096000" cy="3429000"/>
           </a:xfrm>
           <a:prstGeom prst="rect">
             <a:avLst/>
@@ -555,8 +555,8 @@
         </p:nvSpPr>
         <p:spPr>
           <a:xfrm>
-            <a:off x="667068" y="4644271"/>
-            <a:ext cx="5336540" cy="4399836"/>
+            <a:off x="685801" y="4343400"/>
+            <a:ext cx="5486400" cy="4114800"/>
           </a:xfrm>
           <a:prstGeom prst="rect">
             <a:avLst/>
@@ -614,8 +614,8 @@
         </p:nvSpPr>
         <p:spPr>
           <a:xfrm>
-            <a:off x="0" y="9286845"/>
-            <a:ext cx="2890626" cy="488871"/>
+            <a:off x="0" y="8685213"/>
+            <a:ext cx="2971800" cy="457200"/>
           </a:xfrm>
           <a:prstGeom prst="rect">
             <a:avLst/>
@@ -656,8 +656,8 @@
         </p:nvSpPr>
         <p:spPr>
           <a:xfrm>
-            <a:off x="3778505" y="9286845"/>
-            <a:ext cx="2890626" cy="488871"/>
+            <a:off x="3884613" y="8685213"/>
+            <a:ext cx="2971800" cy="457200"/>
           </a:xfrm>
           <a:prstGeom prst="rect">
             <a:avLst/>
@@ -5906,11 +5906,7 @@
             </a:pPr>
             <a:r>
               <a:rPr lang="ru-RU" sz="2000" dirty="0"/>
-              <a:t>Руководитель: к.т.н. </a:t>
-            </a:r>
-            <a:r>
-              <a:rPr lang="ru-RU" sz="2000" dirty="0"/>
-              <a:t>Быстров </a:t>
+              <a:t>Руководитель: к.т.н. Быстров </a:t>
             </a:r>
             <a:r>
               <a:rPr lang="ru-RU" sz="2000" dirty="0" smtClean="0"/>
@@ -6153,11 +6149,7 @@
             </a:r>
             <a:r>
               <a:rPr lang="ru-RU" altLang="en-US" dirty="0" smtClean="0"/>
-              <a:t>й </a:t>
-            </a:r>
-            <a:r>
-              <a:rPr lang="ru-RU" altLang="en-US" dirty="0" smtClean="0"/>
-              <a:t>процесс</a:t>
+              <a:t>й процесс</a:t>
             </a:r>
             <a:endParaRPr lang="en-US" altLang="en-US" dirty="0" smtClean="0"/>
           </a:p>
@@ -7598,23 +7590,7 @@
                   <a:srgbClr val="000000"/>
                 </a:solidFill>
               </a:rPr>
-              <a:t>Разработка быстродействующей системы управления прецизионным поворотным столом для обработки </a:t>
-            </a:r>
-            <a:r>
-              <a:rPr lang="ru-RU" altLang="en-US" sz="2000" dirty="0" smtClean="0">
-                <a:solidFill>
-                  <a:srgbClr val="000000"/>
-                </a:solidFill>
-              </a:rPr>
-              <a:t>драгоценных </a:t>
-            </a:r>
-            <a:r>
-              <a:rPr lang="ru-RU" altLang="en-US" sz="2000" dirty="0" smtClean="0">
-                <a:solidFill>
-                  <a:srgbClr val="000000"/>
-                </a:solidFill>
-              </a:rPr>
-              <a:t>материалов  </a:t>
+              <a:t>Разработка быстродействующей системы управления прецизионным поворотным столом для обработки драгоценных материалов  </a:t>
             </a:r>
             <a:endParaRPr lang="en-US" altLang="en-US" sz="2000" dirty="0" smtClean="0">
               <a:solidFill>
@@ -7678,9 +7654,135 @@
   <p:timing>
     <p:tnLst>
       <p:par>
-        <p:cTn id="1" dur="indefinite" restart="never" nodeType="tmRoot"/>
+        <p:cTn id="1" dur="indefinite" restart="never" nodeType="tmRoot">
+          <p:childTnLst>
+            <p:seq concurrent="1" nextAc="seek">
+              <p:cTn id="2" dur="indefinite" nodeType="mainSeq">
+                <p:childTnLst>
+                  <p:par>
+                    <p:cTn id="3" fill="hold">
+                      <p:stCondLst>
+                        <p:cond delay="indefinite"/>
+                        <p:cond evt="onBegin" delay="0">
+                          <p:tn val="2"/>
+                        </p:cond>
+                      </p:stCondLst>
+                      <p:childTnLst>
+                        <p:par>
+                          <p:cTn id="4" fill="hold">
+                            <p:stCondLst>
+                              <p:cond delay="0"/>
+                            </p:stCondLst>
+                            <p:childTnLst>
+                              <p:par>
+                                <p:cTn id="5" presetID="10" presetClass="entr" presetSubtype="0" fill="hold" grpId="0" nodeType="withEffect">
+                                  <p:stCondLst>
+                                    <p:cond delay="0"/>
+                                  </p:stCondLst>
+                                  <p:childTnLst>
+                                    <p:set>
+                                      <p:cBhvr>
+                                        <p:cTn id="6" dur="1" fill="hold">
+                                          <p:stCondLst>
+                                            <p:cond delay="0"/>
+                                          </p:stCondLst>
+                                        </p:cTn>
+                                        <p:tgtEl>
+                                          <p:spTgt spid="2"/>
+                                        </p:tgtEl>
+                                        <p:attrNameLst>
+                                          <p:attrName>style.visibility</p:attrName>
+                                        </p:attrNameLst>
+                                      </p:cBhvr>
+                                      <p:to>
+                                        <p:strVal val="visible"/>
+                                      </p:to>
+                                    </p:set>
+                                    <p:animEffect transition="in" filter="fade">
+                                      <p:cBhvr>
+                                        <p:cTn id="7" dur="250"/>
+                                        <p:tgtEl>
+                                          <p:spTgt spid="2"/>
+                                        </p:tgtEl>
+                                      </p:cBhvr>
+                                    </p:animEffect>
+                                  </p:childTnLst>
+                                </p:cTn>
+                              </p:par>
+                              <p:par>
+                                <p:cTn id="8" presetID="10" presetClass="entr" presetSubtype="0" fill="hold" grpId="0" nodeType="withEffect">
+                                  <p:stCondLst>
+                                    <p:cond delay="0"/>
+                                  </p:stCondLst>
+                                  <p:childTnLst>
+                                    <p:set>
+                                      <p:cBhvr>
+                                        <p:cTn id="9" dur="1" fill="hold">
+                                          <p:stCondLst>
+                                            <p:cond delay="0"/>
+                                          </p:stCondLst>
+                                        </p:cTn>
+                                        <p:tgtEl>
+                                          <p:spTgt spid="18435">
+                                            <p:txEl>
+                                              <p:pRg st="0" end="0"/>
+                                            </p:txEl>
+                                          </p:spTgt>
+                                        </p:tgtEl>
+                                        <p:attrNameLst>
+                                          <p:attrName>style.visibility</p:attrName>
+                                        </p:attrNameLst>
+                                      </p:cBhvr>
+                                      <p:to>
+                                        <p:strVal val="visible"/>
+                                      </p:to>
+                                    </p:set>
+                                    <p:animEffect transition="in" filter="fade">
+                                      <p:cBhvr>
+                                        <p:cTn id="10" dur="250"/>
+                                        <p:tgtEl>
+                                          <p:spTgt spid="18435">
+                                            <p:txEl>
+                                              <p:pRg st="0" end="0"/>
+                                            </p:txEl>
+                                          </p:spTgt>
+                                        </p:tgtEl>
+                                      </p:cBhvr>
+                                    </p:animEffect>
+                                  </p:childTnLst>
+                                </p:cTn>
+                              </p:par>
+                            </p:childTnLst>
+                          </p:cTn>
+                        </p:par>
+                      </p:childTnLst>
+                    </p:cTn>
+                  </p:par>
+                </p:childTnLst>
+              </p:cTn>
+              <p:prevCondLst>
+                <p:cond evt="onPrev" delay="0">
+                  <p:tgtEl>
+                    <p:sldTgt/>
+                  </p:tgtEl>
+                </p:cond>
+              </p:prevCondLst>
+              <p:nextCondLst>
+                <p:cond evt="onNext" delay="0">
+                  <p:tgtEl>
+                    <p:sldTgt/>
+                  </p:tgtEl>
+                </p:cond>
+              </p:nextCondLst>
+            </p:seq>
+          </p:childTnLst>
+        </p:cTn>
       </p:par>
     </p:tnLst>
+    <p:bldLst>
+      <p:bldP spid="2" grpId="0"/>
+      <p:bldP spid="18435" grpId="0" build="p"/>
+    </p:bldLst>
   </p:timing>
 </p:sld>
 </file>
@@ -8261,9 +8363,126 @@
   <p:timing>
     <p:tnLst>
       <p:par>
-        <p:cTn id="1" dur="indefinite" restart="never" nodeType="tmRoot"/>
+        <p:cTn id="1" dur="indefinite" restart="never" nodeType="tmRoot">
+          <p:childTnLst>
+            <p:seq concurrent="1" nextAc="seek">
+              <p:cTn id="2" dur="indefinite" nodeType="mainSeq">
+                <p:childTnLst>
+                  <p:par>
+                    <p:cTn id="3" fill="hold">
+                      <p:stCondLst>
+                        <p:cond delay="indefinite"/>
+                        <p:cond evt="onBegin" delay="0">
+                          <p:tn val="2"/>
+                        </p:cond>
+                      </p:stCondLst>
+                      <p:childTnLst>
+                        <p:par>
+                          <p:cTn id="4" fill="hold">
+                            <p:stCondLst>
+                              <p:cond delay="0"/>
+                            </p:stCondLst>
+                            <p:childTnLst>
+                              <p:par>
+                                <p:cTn id="5" presetID="10" presetClass="entr" presetSubtype="0" fill="hold" grpId="0" nodeType="withEffect">
+                                  <p:stCondLst>
+                                    <p:cond delay="0"/>
+                                  </p:stCondLst>
+                                  <p:childTnLst>
+                                    <p:set>
+                                      <p:cBhvr>
+                                        <p:cTn id="6" dur="1" fill="hold">
+                                          <p:stCondLst>
+                                            <p:cond delay="0"/>
+                                          </p:stCondLst>
+                                        </p:cTn>
+                                        <p:tgtEl>
+                                          <p:spTgt spid="2"/>
+                                        </p:tgtEl>
+                                        <p:attrNameLst>
+                                          <p:attrName>style.visibility</p:attrName>
+                                        </p:attrNameLst>
+                                      </p:cBhvr>
+                                      <p:to>
+                                        <p:strVal val="visible"/>
+                                      </p:to>
+                                    </p:set>
+                                    <p:animEffect transition="in" filter="fade">
+                                      <p:cBhvr>
+                                        <p:cTn id="7" dur="250"/>
+                                        <p:tgtEl>
+                                          <p:spTgt spid="2"/>
+                                        </p:tgtEl>
+                                      </p:cBhvr>
+                                    </p:animEffect>
+                                  </p:childTnLst>
+                                </p:cTn>
+                              </p:par>
+                              <p:par>
+                                <p:cTn id="8" presetID="10" presetClass="entr" presetSubtype="0" fill="hold" nodeType="withEffect">
+                                  <p:stCondLst>
+                                    <p:cond delay="0"/>
+                                  </p:stCondLst>
+                                  <p:childTnLst>
+                                    <p:set>
+                                      <p:cBhvr>
+                                        <p:cTn id="9" dur="1" fill="hold">
+                                          <p:stCondLst>
+                                            <p:cond delay="0"/>
+                                          </p:stCondLst>
+                                        </p:cTn>
+                                        <p:tgtEl>
+                                          <p:spTgt spid="4"/>
+                                        </p:tgtEl>
+                                        <p:attrNameLst>
+                                          <p:attrName>style.visibility</p:attrName>
+                                        </p:attrNameLst>
+                                      </p:cBhvr>
+                                      <p:to>
+                                        <p:strVal val="visible"/>
+                                      </p:to>
+                                    </p:set>
+                                    <p:animEffect transition="in" filter="fade">
+                                      <p:cBhvr>
+                                        <p:cTn id="10" dur="250"/>
+                                        <p:tgtEl>
+                                          <p:spTgt spid="4"/>
+                                        </p:tgtEl>
+                                      </p:cBhvr>
+                                    </p:animEffect>
+                                  </p:childTnLst>
+                                </p:cTn>
+                              </p:par>
+                            </p:childTnLst>
+                          </p:cTn>
+                        </p:par>
+                      </p:childTnLst>
+                    </p:cTn>
+                  </p:par>
+                </p:childTnLst>
+              </p:cTn>
+              <p:prevCondLst>
+                <p:cond evt="onPrev" delay="0">
+                  <p:tgtEl>
+                    <p:sldTgt/>
+                  </p:tgtEl>
+                </p:cond>
+              </p:prevCondLst>
+              <p:nextCondLst>
+                <p:cond evt="onNext" delay="0">
+                  <p:tgtEl>
+                    <p:sldTgt/>
+                  </p:tgtEl>
+                </p:cond>
+              </p:nextCondLst>
+            </p:seq>
+          </p:childTnLst>
+        </p:cTn>
       </p:par>
     </p:tnLst>
+    <p:bldLst>
+      <p:bldP spid="2" grpId="0"/>
+    </p:bldLst>
   </p:timing>
 </p:sld>
 </file>
@@ -8306,10 +8525,10 @@
           <a:lstStyle/>
           <a:p>
             <a:r>
-              <a:rPr lang="ru-RU" altLang="en-US" smtClean="0"/>
+              <a:rPr lang="ru-RU" altLang="en-US" dirty="0" smtClean="0"/>
               <a:t>Функциональная схема системы</a:t>
             </a:r>
-            <a:endParaRPr lang="en-US" altLang="en-US" smtClean="0"/>
+            <a:endParaRPr lang="en-US" altLang="en-US" dirty="0" smtClean="0"/>
           </a:p>
         </p:txBody>
       </p:sp>
@@ -8397,9 +8616,126 @@
   <p:timing>
     <p:tnLst>
       <p:par>
-        <p:cTn id="1" dur="indefinite" restart="never" nodeType="tmRoot"/>
+        <p:cTn id="1" dur="indefinite" restart="never" nodeType="tmRoot">
+          <p:childTnLst>
+            <p:seq concurrent="1" nextAc="seek">
+              <p:cTn id="2" dur="indefinite" nodeType="mainSeq">
+                <p:childTnLst>
+                  <p:par>
+                    <p:cTn id="3" fill="hold">
+                      <p:stCondLst>
+                        <p:cond delay="indefinite"/>
+                        <p:cond evt="onBegin" delay="0">
+                          <p:tn val="2"/>
+                        </p:cond>
+                      </p:stCondLst>
+                      <p:childTnLst>
+                        <p:par>
+                          <p:cTn id="4" fill="hold">
+                            <p:stCondLst>
+                              <p:cond delay="0"/>
+                            </p:stCondLst>
+                            <p:childTnLst>
+                              <p:par>
+                                <p:cTn id="5" presetID="10" presetClass="entr" presetSubtype="0" fill="hold" grpId="0" nodeType="withEffect">
+                                  <p:stCondLst>
+                                    <p:cond delay="0"/>
+                                  </p:stCondLst>
+                                  <p:childTnLst>
+                                    <p:set>
+                                      <p:cBhvr>
+                                        <p:cTn id="6" dur="1" fill="hold">
+                                          <p:stCondLst>
+                                            <p:cond delay="0"/>
+                                          </p:stCondLst>
+                                        </p:cTn>
+                                        <p:tgtEl>
+                                          <p:spTgt spid="20482"/>
+                                        </p:tgtEl>
+                                        <p:attrNameLst>
+                                          <p:attrName>style.visibility</p:attrName>
+                                        </p:attrNameLst>
+                                      </p:cBhvr>
+                                      <p:to>
+                                        <p:strVal val="visible"/>
+                                      </p:to>
+                                    </p:set>
+                                    <p:animEffect transition="in" filter="fade">
+                                      <p:cBhvr>
+                                        <p:cTn id="7" dur="250"/>
+                                        <p:tgtEl>
+                                          <p:spTgt spid="20482"/>
+                                        </p:tgtEl>
+                                      </p:cBhvr>
+                                    </p:animEffect>
+                                  </p:childTnLst>
+                                </p:cTn>
+                              </p:par>
+                              <p:par>
+                                <p:cTn id="8" presetID="10" presetClass="entr" presetSubtype="0" fill="hold" nodeType="withEffect">
+                                  <p:stCondLst>
+                                    <p:cond delay="0"/>
+                                  </p:stCondLst>
+                                  <p:childTnLst>
+                                    <p:set>
+                                      <p:cBhvr>
+                                        <p:cTn id="9" dur="1" fill="hold">
+                                          <p:stCondLst>
+                                            <p:cond delay="0"/>
+                                          </p:stCondLst>
+                                        </p:cTn>
+                                        <p:tgtEl>
+                                          <p:spTgt spid="2"/>
+                                        </p:tgtEl>
+                                        <p:attrNameLst>
+                                          <p:attrName>style.visibility</p:attrName>
+                                        </p:attrNameLst>
+                                      </p:cBhvr>
+                                      <p:to>
+                                        <p:strVal val="visible"/>
+                                      </p:to>
+                                    </p:set>
+                                    <p:animEffect transition="in" filter="fade">
+                                      <p:cBhvr>
+                                        <p:cTn id="10" dur="250"/>
+                                        <p:tgtEl>
+                                          <p:spTgt spid="2"/>
+                                        </p:tgtEl>
+                                      </p:cBhvr>
+                                    </p:animEffect>
+                                  </p:childTnLst>
+                                </p:cTn>
+                              </p:par>
+                            </p:childTnLst>
+                          </p:cTn>
+                        </p:par>
+                      </p:childTnLst>
+                    </p:cTn>
+                  </p:par>
+                </p:childTnLst>
+              </p:cTn>
+              <p:prevCondLst>
+                <p:cond evt="onPrev" delay="0">
+                  <p:tgtEl>
+                    <p:sldTgt/>
+                  </p:tgtEl>
+                </p:cond>
+              </p:prevCondLst>
+              <p:nextCondLst>
+                <p:cond evt="onNext" delay="0">
+                  <p:tgtEl>
+                    <p:sldTgt/>
+                  </p:tgtEl>
+                </p:cond>
+              </p:nextCondLst>
+            </p:seq>
+          </p:childTnLst>
+        </p:cTn>
       </p:par>
     </p:tnLst>
+    <p:bldLst>
+      <p:bldP spid="20482" grpId="0"/>
+    </p:bldLst>
   </p:timing>
 </p:sld>
 </file>
@@ -9723,8 +10059,8 @@
           </a:extLst>
         </p:spPr>
       </p:pic>
-      <mc:AlternateContent xmlns:mc="http://schemas.openxmlformats.org/markup-compatibility/2006">
-        <mc:Choice xmlns:a14="http://schemas.microsoft.com/office/drawing/2010/main" Requires="a14">
+      <mc:AlternateContent xmlns:mc="http://schemas.openxmlformats.org/markup-compatibility/2006" xmlns:a14="http://schemas.microsoft.com/office/drawing/2010/main">
+        <mc:Choice Requires="a14">
           <p:sp>
             <p:nvSpPr>
               <p:cNvPr id="2" name="TextBox 1"/>
@@ -9747,6 +10083,7 @@
               </a:bodyPr>
               <a:lstStyle/>
               <a:p>
+                <a:pPr/>
                 <a14:m>
                   <m:oMathPara xmlns:m="http://schemas.openxmlformats.org/officeDocument/2006/math">
                     <m:oMathParaPr>
@@ -10031,7 +10368,7 @@
             </p:txBody>
           </p:sp>
         </mc:Choice>
-        <mc:Fallback>
+        <mc:Fallback xmlns="">
           <p:sp>
             <p:nvSpPr>
               <p:cNvPr id="2" name="TextBox 1"/>

</xml_diff>

<commit_message>
added discrete in pres and fixed speech
</commit_message>
<xml_diff>
--- a/диплом.pptx
+++ b/диплом.pptx
@@ -284,7 +284,7 @@
               <a:pPr>
                 <a:defRPr/>
               </a:pPr>
-              <a:t>5/17/2018</a:t>
+              <a:t>5/20/2018</a:t>
             </a:fld>
             <a:endParaRPr lang="en-US"/>
           </a:p>
@@ -503,7 +503,7 @@
               <a:pPr>
                 <a:defRPr/>
               </a:pPr>
-              <a:t>5/17/2018</a:t>
+              <a:t>5/20/2018</a:t>
             </a:fld>
             <a:endParaRPr lang="en-US"/>
           </a:p>
@@ -1715,7 +1715,7 @@
           <p:cNvPr id="11" name="Footer Placeholder 3">
             <a:extLst>
               <a:ext uri="{FF2B5EF4-FFF2-40B4-BE49-F238E27FC236}">
-                <a16:creationId xmlns:a16="http://schemas.microsoft.com/office/drawing/2014/main" xmlns="" id="{0244A044-2B4E-4B3F-913E-D0FFBE3CE288}"/>
+                <a16:creationId xmlns="" xmlns:a16="http://schemas.microsoft.com/office/drawing/2014/main" id="{0244A044-2B4E-4B3F-913E-D0FFBE3CE288}"/>
               </a:ext>
             </a:extLst>
           </p:cNvPr>
@@ -2037,7 +2037,7 @@
           <p:cNvPr id="5" name="Footer Placeholder 3">
             <a:extLst>
               <a:ext uri="{FF2B5EF4-FFF2-40B4-BE49-F238E27FC236}">
-                <a16:creationId xmlns:a16="http://schemas.microsoft.com/office/drawing/2014/main" xmlns="" id="{5E533321-7583-408D-9901-7C5B5BBEA39D}"/>
+                <a16:creationId xmlns="" xmlns:a16="http://schemas.microsoft.com/office/drawing/2014/main" id="{5E533321-7583-408D-9901-7C5B5BBEA39D}"/>
               </a:ext>
             </a:extLst>
           </p:cNvPr>
@@ -2118,7 +2118,7 @@
           <p:cNvPr id="2" name="Footer Placeholder 3">
             <a:extLst>
               <a:ext uri="{FF2B5EF4-FFF2-40B4-BE49-F238E27FC236}">
-                <a16:creationId xmlns:a16="http://schemas.microsoft.com/office/drawing/2014/main" xmlns="" id="{5DC51F17-9EA1-4747-B019-97EF835305E5}"/>
+                <a16:creationId xmlns="" xmlns:a16="http://schemas.microsoft.com/office/drawing/2014/main" id="{5DC51F17-9EA1-4747-B019-97EF835305E5}"/>
               </a:ext>
             </a:extLst>
           </p:cNvPr>
@@ -3221,7 +3221,7 @@
           <p:cNvPr id="4" name="Footer Placeholder 3">
             <a:extLst>
               <a:ext uri="{FF2B5EF4-FFF2-40B4-BE49-F238E27FC236}">
-                <a16:creationId xmlns:a16="http://schemas.microsoft.com/office/drawing/2014/main" xmlns="" id="{EBDC7A0B-8867-41EC-8AAA-187EB14F6428}"/>
+                <a16:creationId xmlns="" xmlns:a16="http://schemas.microsoft.com/office/drawing/2014/main" id="{EBDC7A0B-8867-41EC-8AAA-187EB14F6428}"/>
               </a:ext>
             </a:extLst>
           </p:cNvPr>
@@ -3505,7 +3505,7 @@
           <p:cNvPr id="5" name="Footer Placeholder 3">
             <a:extLst>
               <a:ext uri="{FF2B5EF4-FFF2-40B4-BE49-F238E27FC236}">
-                <a16:creationId xmlns:a16="http://schemas.microsoft.com/office/drawing/2014/main" xmlns="" id="{9CA97FF2-32B6-46EC-AF54-2834E05C2F41}"/>
+                <a16:creationId xmlns="" xmlns:a16="http://schemas.microsoft.com/office/drawing/2014/main" id="{9CA97FF2-32B6-46EC-AF54-2834E05C2F41}"/>
               </a:ext>
             </a:extLst>
           </p:cNvPr>
@@ -3841,7 +3841,7 @@
           <p:cNvPr id="6" name="Footer Placeholder 3">
             <a:extLst>
               <a:ext uri="{FF2B5EF4-FFF2-40B4-BE49-F238E27FC236}">
-                <a16:creationId xmlns:a16="http://schemas.microsoft.com/office/drawing/2014/main" xmlns="" id="{CEBB575C-7F2D-4A5A-A681-2DF7BECD21DC}"/>
+                <a16:creationId xmlns="" xmlns:a16="http://schemas.microsoft.com/office/drawing/2014/main" id="{CEBB575C-7F2D-4A5A-A681-2DF7BECD21DC}"/>
               </a:ext>
             </a:extLst>
           </p:cNvPr>
@@ -4382,7 +4382,7 @@
           <p:cNvPr id="15" name="Footer Placeholder 3">
             <a:extLst>
               <a:ext uri="{FF2B5EF4-FFF2-40B4-BE49-F238E27FC236}">
-                <a16:creationId xmlns:a16="http://schemas.microsoft.com/office/drawing/2014/main" xmlns="" id="{F09A08B9-2184-4E78-809F-6EC1F0EA3CD9}"/>
+                <a16:creationId xmlns="" xmlns:a16="http://schemas.microsoft.com/office/drawing/2014/main" id="{F09A08B9-2184-4E78-809F-6EC1F0EA3CD9}"/>
               </a:ext>
             </a:extLst>
           </p:cNvPr>
@@ -6214,7 +6214,7 @@
           <p:cNvPr id="7" name="TextBox 6">
             <a:extLst>
               <a:ext uri="{FF2B5EF4-FFF2-40B4-BE49-F238E27FC236}">
-                <a16:creationId xmlns:a16="http://schemas.microsoft.com/office/drawing/2014/main" xmlns="" id="{D661FBD8-5B56-421E-943D-102F87B9DE84}"/>
+                <a16:creationId xmlns="" xmlns:a16="http://schemas.microsoft.com/office/drawing/2014/main" id="{D661FBD8-5B56-421E-943D-102F87B9DE84}"/>
               </a:ext>
             </a:extLst>
           </p:cNvPr>
@@ -6691,60 +6691,6 @@
           </a:p>
         </p:txBody>
       </p:sp>
-      <p:pic>
-        <p:nvPicPr>
-          <p:cNvPr id="29699" name="Рисунок 4"/>
-          <p:cNvPicPr>
-            <a:picLocks noChangeAspect="1" noChangeArrowheads="1"/>
-          </p:cNvPicPr>
-          <p:nvPr/>
-        </p:nvPicPr>
-        <p:blipFill>
-          <a:blip r:embed="rId2">
-            <a:extLst>
-              <a:ext uri="{28A0092B-C50C-407E-A947-70E740481C1C}">
-                <a14:useLocalDpi xmlns:a14="http://schemas.microsoft.com/office/drawing/2010/main" val="0"/>
-              </a:ext>
-            </a:extLst>
-          </a:blip>
-          <a:srcRect/>
-          <a:stretch>
-            <a:fillRect/>
-          </a:stretch>
-        </p:blipFill>
-        <p:spPr bwMode="auto">
-          <a:xfrm>
-            <a:off x="1444625" y="1616075"/>
-            <a:ext cx="6254750" cy="2773363"/>
-          </a:xfrm>
-          <a:prstGeom prst="rect">
-            <a:avLst/>
-          </a:prstGeom>
-          <a:noFill/>
-          <a:ln>
-            <a:noFill/>
-          </a:ln>
-          <a:extLst>
-            <a:ext uri="{909E8E84-426E-40DD-AFC4-6F175D3DCCD1}">
-              <a14:hiddenFill xmlns:a14="http://schemas.microsoft.com/office/drawing/2010/main">
-                <a:solidFill>
-                  <a:srgbClr val="FFFFFF"/>
-                </a:solidFill>
-              </a14:hiddenFill>
-            </a:ext>
-            <a:ext uri="{91240B29-F687-4F45-9708-019B960494DF}">
-              <a14:hiddenLine xmlns:a14="http://schemas.microsoft.com/office/drawing/2010/main" w="9525">
-                <a:solidFill>
-                  <a:srgbClr val="000000"/>
-                </a:solidFill>
-                <a:miter lim="800000"/>
-                <a:headEnd/>
-                <a:tailEnd/>
-              </a14:hiddenLine>
-            </a:ext>
-          </a:extLst>
-        </p:spPr>
-      </p:pic>
       <p:sp>
         <p:nvSpPr>
           <p:cNvPr id="4" name="TextBox 3"/>
@@ -6783,6 +6729,36 @@
           </a:p>
         </p:txBody>
       </p:sp>
+      <p:pic>
+        <p:nvPicPr>
+          <p:cNvPr id="3" name="Picture 2"/>
+          <p:cNvPicPr>
+            <a:picLocks noChangeAspect="1"/>
+          </p:cNvPicPr>
+          <p:nvPr/>
+        </p:nvPicPr>
+        <p:blipFill>
+          <a:blip r:embed="rId2">
+            <a:extLst>
+              <a:ext uri="{28A0092B-C50C-407E-A947-70E740481C1C}">
+                <a14:useLocalDpi xmlns:a14="http://schemas.microsoft.com/office/drawing/2010/main" val="0"/>
+              </a:ext>
+            </a:extLst>
+          </a:blip>
+          <a:stretch>
+            <a:fillRect/>
+          </a:stretch>
+        </p:blipFill>
+        <p:spPr>
+          <a:xfrm>
+            <a:off x="1444625" y="1560220"/>
+            <a:ext cx="6254750" cy="2871196"/>
+          </a:xfrm>
+          <a:prstGeom prst="rect">
+            <a:avLst/>
+          </a:prstGeom>
+        </p:spPr>
+      </p:pic>
     </p:spTree>
   </p:cSld>
   <p:clrMapOvr>
@@ -6883,14 +6859,14 @@
                 <a:gridCol w="4888298">
                   <a:extLst>
                     <a:ext uri="{9D8B030D-6E8A-4147-A177-3AD203B41FA5}">
-                      <a16:colId xmlns:a16="http://schemas.microsoft.com/office/drawing/2014/main" xmlns="" val="20000"/>
+                      <a16:colId xmlns="" xmlns:a16="http://schemas.microsoft.com/office/drawing/2014/main" val="20000"/>
                     </a:ext>
                   </a:extLst>
                 </a:gridCol>
                 <a:gridCol w="2660265">
                   <a:extLst>
                     <a:ext uri="{9D8B030D-6E8A-4147-A177-3AD203B41FA5}">
-                      <a16:colId xmlns:a16="http://schemas.microsoft.com/office/drawing/2014/main" xmlns="" val="20001"/>
+                      <a16:colId xmlns="" xmlns:a16="http://schemas.microsoft.com/office/drawing/2014/main" val="20001"/>
                     </a:ext>
                   </a:extLst>
                 </a:gridCol>
@@ -6998,7 +6974,7 @@
                 </a:tc>
                 <a:extLst>
                   <a:ext uri="{0D108BD9-81ED-4DB2-BD59-A6C34878D82A}">
-                    <a16:rowId xmlns:a16="http://schemas.microsoft.com/office/drawing/2014/main" xmlns="" val="10000"/>
+                    <a16:rowId xmlns="" xmlns:a16="http://schemas.microsoft.com/office/drawing/2014/main" val="10000"/>
                   </a:ext>
                 </a:extLst>
               </a:tr>
@@ -7060,7 +7036,7 @@
                 </a:tc>
                 <a:extLst>
                   <a:ext uri="{0D108BD9-81ED-4DB2-BD59-A6C34878D82A}">
-                    <a16:rowId xmlns:a16="http://schemas.microsoft.com/office/drawing/2014/main" xmlns="" val="10001"/>
+                    <a16:rowId xmlns="" xmlns:a16="http://schemas.microsoft.com/office/drawing/2014/main" val="10001"/>
                   </a:ext>
                 </a:extLst>
               </a:tr>
@@ -7127,7 +7103,7 @@
                 </a:tc>
                 <a:extLst>
                   <a:ext uri="{0D108BD9-81ED-4DB2-BD59-A6C34878D82A}">
-                    <a16:rowId xmlns:a16="http://schemas.microsoft.com/office/drawing/2014/main" xmlns="" val="10002"/>
+                    <a16:rowId xmlns="" xmlns:a16="http://schemas.microsoft.com/office/drawing/2014/main" val="10002"/>
                   </a:ext>
                 </a:extLst>
               </a:tr>
@@ -7194,7 +7170,7 @@
                 </a:tc>
                 <a:extLst>
                   <a:ext uri="{0D108BD9-81ED-4DB2-BD59-A6C34878D82A}">
-                    <a16:rowId xmlns:a16="http://schemas.microsoft.com/office/drawing/2014/main" xmlns="" val="10003"/>
+                    <a16:rowId xmlns="" xmlns:a16="http://schemas.microsoft.com/office/drawing/2014/main" val="10003"/>
                   </a:ext>
                 </a:extLst>
               </a:tr>
@@ -7253,7 +7229,7 @@
                 </a:tc>
                 <a:extLst>
                   <a:ext uri="{0D108BD9-81ED-4DB2-BD59-A6C34878D82A}">
-                    <a16:rowId xmlns:a16="http://schemas.microsoft.com/office/drawing/2014/main" xmlns="" val="10004"/>
+                    <a16:rowId xmlns="" xmlns:a16="http://schemas.microsoft.com/office/drawing/2014/main" val="10004"/>
                   </a:ext>
                 </a:extLst>
               </a:tr>
@@ -7312,7 +7288,7 @@
                 </a:tc>
                 <a:extLst>
                   <a:ext uri="{0D108BD9-81ED-4DB2-BD59-A6C34878D82A}">
-                    <a16:rowId xmlns:a16="http://schemas.microsoft.com/office/drawing/2014/main" xmlns="" val="10005"/>
+                    <a16:rowId xmlns="" xmlns:a16="http://schemas.microsoft.com/office/drawing/2014/main" val="10005"/>
                   </a:ext>
                 </a:extLst>
               </a:tr>
@@ -7872,14 +7848,14 @@
                 <a:gridCol w="4252973">
                   <a:extLst>
                     <a:ext uri="{9D8B030D-6E8A-4147-A177-3AD203B41FA5}">
-                      <a16:colId xmlns:a16="http://schemas.microsoft.com/office/drawing/2014/main" xmlns="" val="20000"/>
+                      <a16:colId xmlns="" xmlns:a16="http://schemas.microsoft.com/office/drawing/2014/main" val="20000"/>
                     </a:ext>
                   </a:extLst>
                 </a:gridCol>
                 <a:gridCol w="2314515">
                   <a:extLst>
                     <a:ext uri="{9D8B030D-6E8A-4147-A177-3AD203B41FA5}">
-                      <a16:colId xmlns:a16="http://schemas.microsoft.com/office/drawing/2014/main" xmlns="" val="20001"/>
+                      <a16:colId xmlns="" xmlns:a16="http://schemas.microsoft.com/office/drawing/2014/main" val="20001"/>
                     </a:ext>
                   </a:extLst>
                 </a:gridCol>
@@ -7987,7 +7963,7 @@
                 </a:tc>
                 <a:extLst>
                   <a:ext uri="{0D108BD9-81ED-4DB2-BD59-A6C34878D82A}">
-                    <a16:rowId xmlns:a16="http://schemas.microsoft.com/office/drawing/2014/main" xmlns="" val="10000"/>
+                    <a16:rowId xmlns="" xmlns:a16="http://schemas.microsoft.com/office/drawing/2014/main" val="10000"/>
                   </a:ext>
                 </a:extLst>
               </a:tr>
@@ -8049,7 +8025,7 @@
                 </a:tc>
                 <a:extLst>
                   <a:ext uri="{0D108BD9-81ED-4DB2-BD59-A6C34878D82A}">
-                    <a16:rowId xmlns:a16="http://schemas.microsoft.com/office/drawing/2014/main" xmlns="" val="10001"/>
+                    <a16:rowId xmlns="" xmlns:a16="http://schemas.microsoft.com/office/drawing/2014/main" val="10001"/>
                   </a:ext>
                 </a:extLst>
               </a:tr>
@@ -8116,7 +8092,7 @@
                 </a:tc>
                 <a:extLst>
                   <a:ext uri="{0D108BD9-81ED-4DB2-BD59-A6C34878D82A}">
-                    <a16:rowId xmlns:a16="http://schemas.microsoft.com/office/drawing/2014/main" xmlns="" val="10002"/>
+                    <a16:rowId xmlns="" xmlns:a16="http://schemas.microsoft.com/office/drawing/2014/main" val="10002"/>
                   </a:ext>
                 </a:extLst>
               </a:tr>
@@ -8183,7 +8159,7 @@
                 </a:tc>
                 <a:extLst>
                   <a:ext uri="{0D108BD9-81ED-4DB2-BD59-A6C34878D82A}">
-                    <a16:rowId xmlns:a16="http://schemas.microsoft.com/office/drawing/2014/main" xmlns="" val="10003"/>
+                    <a16:rowId xmlns="" xmlns:a16="http://schemas.microsoft.com/office/drawing/2014/main" val="10003"/>
                   </a:ext>
                 </a:extLst>
               </a:tr>
@@ -8242,7 +8218,7 @@
                 </a:tc>
                 <a:extLst>
                   <a:ext uri="{0D108BD9-81ED-4DB2-BD59-A6C34878D82A}">
-                    <a16:rowId xmlns:a16="http://schemas.microsoft.com/office/drawing/2014/main" xmlns="" val="10004"/>
+                    <a16:rowId xmlns="" xmlns:a16="http://schemas.microsoft.com/office/drawing/2014/main" val="10004"/>
                   </a:ext>
                 </a:extLst>
               </a:tr>
@@ -8301,7 +8277,7 @@
                 </a:tc>
                 <a:extLst>
                   <a:ext uri="{0D108BD9-81ED-4DB2-BD59-A6C34878D82A}">
-                    <a16:rowId xmlns:a16="http://schemas.microsoft.com/office/drawing/2014/main" xmlns="" val="10005"/>
+                    <a16:rowId xmlns="" xmlns:a16="http://schemas.microsoft.com/office/drawing/2014/main" val="10005"/>
                   </a:ext>
                 </a:extLst>
               </a:tr>
@@ -8840,14 +8816,14 @@
                 <a:gridCol w="4888298">
                   <a:extLst>
                     <a:ext uri="{9D8B030D-6E8A-4147-A177-3AD203B41FA5}">
-                      <a16:colId xmlns:a16="http://schemas.microsoft.com/office/drawing/2014/main" xmlns="" val="20000"/>
+                      <a16:colId xmlns="" xmlns:a16="http://schemas.microsoft.com/office/drawing/2014/main" val="20000"/>
                     </a:ext>
                   </a:extLst>
                 </a:gridCol>
                 <a:gridCol w="2660265">
                   <a:extLst>
                     <a:ext uri="{9D8B030D-6E8A-4147-A177-3AD203B41FA5}">
-                      <a16:colId xmlns:a16="http://schemas.microsoft.com/office/drawing/2014/main" xmlns="" val="20001"/>
+                      <a16:colId xmlns="" xmlns:a16="http://schemas.microsoft.com/office/drawing/2014/main" val="20001"/>
                     </a:ext>
                   </a:extLst>
                 </a:gridCol>
@@ -8918,7 +8894,7 @@
                 </a:tc>
                 <a:extLst>
                   <a:ext uri="{0D108BD9-81ED-4DB2-BD59-A6C34878D82A}">
-                    <a16:rowId xmlns:a16="http://schemas.microsoft.com/office/drawing/2014/main" xmlns="" val="10000"/>
+                    <a16:rowId xmlns="" xmlns:a16="http://schemas.microsoft.com/office/drawing/2014/main" val="10000"/>
                   </a:ext>
                 </a:extLst>
               </a:tr>
@@ -8996,7 +8972,7 @@
                 </a:tc>
                 <a:extLst>
                   <a:ext uri="{0D108BD9-81ED-4DB2-BD59-A6C34878D82A}">
-                    <a16:rowId xmlns:a16="http://schemas.microsoft.com/office/drawing/2014/main" xmlns="" val="10001"/>
+                    <a16:rowId xmlns="" xmlns:a16="http://schemas.microsoft.com/office/drawing/2014/main" val="10001"/>
                   </a:ext>
                 </a:extLst>
               </a:tr>
@@ -9045,7 +9021,7 @@
                 </a:tc>
                 <a:extLst>
                   <a:ext uri="{0D108BD9-81ED-4DB2-BD59-A6C34878D82A}">
-                    <a16:rowId xmlns:a16="http://schemas.microsoft.com/office/drawing/2014/main" xmlns="" val="10002"/>
+                    <a16:rowId xmlns="" xmlns:a16="http://schemas.microsoft.com/office/drawing/2014/main" val="10002"/>
                   </a:ext>
                 </a:extLst>
               </a:tr>
@@ -9099,7 +9075,7 @@
                 </a:tc>
                 <a:extLst>
                   <a:ext uri="{0D108BD9-81ED-4DB2-BD59-A6C34878D82A}">
-                    <a16:rowId xmlns:a16="http://schemas.microsoft.com/office/drawing/2014/main" xmlns="" val="10003"/>
+                    <a16:rowId xmlns="" xmlns:a16="http://schemas.microsoft.com/office/drawing/2014/main" val="10003"/>
                   </a:ext>
                 </a:extLst>
               </a:tr>
@@ -9148,7 +9124,7 @@
                 </a:tc>
                 <a:extLst>
                   <a:ext uri="{0D108BD9-81ED-4DB2-BD59-A6C34878D82A}">
-                    <a16:rowId xmlns:a16="http://schemas.microsoft.com/office/drawing/2014/main" xmlns="" val="10004"/>
+                    <a16:rowId xmlns="" xmlns:a16="http://schemas.microsoft.com/office/drawing/2014/main" val="10004"/>
                   </a:ext>
                 </a:extLst>
               </a:tr>
@@ -9197,7 +9173,7 @@
                 </a:tc>
                 <a:extLst>
                   <a:ext uri="{0D108BD9-81ED-4DB2-BD59-A6C34878D82A}">
-                    <a16:rowId xmlns:a16="http://schemas.microsoft.com/office/drawing/2014/main" xmlns="" val="10005"/>
+                    <a16:rowId xmlns="" xmlns:a16="http://schemas.microsoft.com/office/drawing/2014/main" val="10005"/>
                   </a:ext>
                 </a:extLst>
               </a:tr>
@@ -9357,14 +9333,14 @@
                 <a:gridCol w="4888298">
                   <a:extLst>
                     <a:ext uri="{9D8B030D-6E8A-4147-A177-3AD203B41FA5}">
-                      <a16:colId xmlns:a16="http://schemas.microsoft.com/office/drawing/2014/main" xmlns="" val="20000"/>
+                      <a16:colId xmlns="" xmlns:a16="http://schemas.microsoft.com/office/drawing/2014/main" val="20000"/>
                     </a:ext>
                   </a:extLst>
                 </a:gridCol>
                 <a:gridCol w="2660265">
                   <a:extLst>
                     <a:ext uri="{9D8B030D-6E8A-4147-A177-3AD203B41FA5}">
-                      <a16:colId xmlns:a16="http://schemas.microsoft.com/office/drawing/2014/main" xmlns="" val="20001"/>
+                      <a16:colId xmlns="" xmlns:a16="http://schemas.microsoft.com/office/drawing/2014/main" val="20001"/>
                     </a:ext>
                   </a:extLst>
                 </a:gridCol>
@@ -9414,7 +9390,7 @@
                 </a:tc>
                 <a:extLst>
                   <a:ext uri="{0D108BD9-81ED-4DB2-BD59-A6C34878D82A}">
-                    <a16:rowId xmlns:a16="http://schemas.microsoft.com/office/drawing/2014/main" xmlns="" val="10000"/>
+                    <a16:rowId xmlns="" xmlns:a16="http://schemas.microsoft.com/office/drawing/2014/main" val="10000"/>
                   </a:ext>
                 </a:extLst>
               </a:tr>
@@ -9463,7 +9439,7 @@
                 </a:tc>
                 <a:extLst>
                   <a:ext uri="{0D108BD9-81ED-4DB2-BD59-A6C34878D82A}">
-                    <a16:rowId xmlns:a16="http://schemas.microsoft.com/office/drawing/2014/main" xmlns="" val="10001"/>
+                    <a16:rowId xmlns="" xmlns:a16="http://schemas.microsoft.com/office/drawing/2014/main" val="10001"/>
                   </a:ext>
                 </a:extLst>
               </a:tr>
@@ -9512,7 +9488,7 @@
                 </a:tc>
                 <a:extLst>
                   <a:ext uri="{0D108BD9-81ED-4DB2-BD59-A6C34878D82A}">
-                    <a16:rowId xmlns:a16="http://schemas.microsoft.com/office/drawing/2014/main" xmlns="" val="10002"/>
+                    <a16:rowId xmlns="" xmlns:a16="http://schemas.microsoft.com/office/drawing/2014/main" val="10002"/>
                   </a:ext>
                 </a:extLst>
               </a:tr>
@@ -9573,7 +9549,7 @@
                 </a:tc>
                 <a:extLst>
                   <a:ext uri="{0D108BD9-81ED-4DB2-BD59-A6C34878D82A}">
-                    <a16:rowId xmlns:a16="http://schemas.microsoft.com/office/drawing/2014/main" xmlns="" val="10003"/>
+                    <a16:rowId xmlns="" xmlns:a16="http://schemas.microsoft.com/office/drawing/2014/main" val="10003"/>
                   </a:ext>
                 </a:extLst>
               </a:tr>
@@ -9862,7 +9838,7 @@
           <p:cNvPr id="8" name="TextBox 7">
             <a:extLst>
               <a:ext uri="{FF2B5EF4-FFF2-40B4-BE49-F238E27FC236}">
-                <a16:creationId xmlns:a16="http://schemas.microsoft.com/office/drawing/2014/main" xmlns="" id="{733F23C4-61A4-4E4B-B26A-8D993D5CF3D0}"/>
+                <a16:creationId xmlns="" xmlns:a16="http://schemas.microsoft.com/office/drawing/2014/main" id="{733F23C4-61A4-4E4B-B26A-8D993D5CF3D0}"/>
               </a:ext>
             </a:extLst>
           </p:cNvPr>

</xml_diff>